<commit_message>
Sistema Comércio: framework C#, SQL Server, Procedure SQL e 3 camadas
</commit_message>
<xml_diff>
--- a/EsquemaMVC.pptx
+++ b/EsquemaMVC.pptx
@@ -192,7 +192,7 @@
           <a:p>
             <a:fld id="{D3B038AC-227E-4F7E-A537-1D181A60FB23}" type="datetimeFigureOut">
               <a:rPr lang="pt-BR" smtClean="0"/>
-              <a:t>23/03/2025</a:t>
+              <a:t>12/07/2025</a:t>
             </a:fld>
             <a:endParaRPr lang="pt-BR"/>
           </a:p>
@@ -641,7 +641,7 @@
           <a:p>
             <a:fld id="{2E700DB3-DBF0-4086-B675-117E7A9610B8}" type="datetimeFigureOut">
               <a:rPr lang="pt-BR" smtClean="0"/>
-              <a:t>23/03/2025</a:t>
+              <a:t>12/07/2025</a:t>
             </a:fld>
             <a:endParaRPr lang="pt-BR"/>
           </a:p>
@@ -806,7 +806,7 @@
           <a:p>
             <a:fld id="{2E700DB3-DBF0-4086-B675-117E7A9610B8}" type="datetimeFigureOut">
               <a:rPr lang="pt-BR" smtClean="0"/>
-              <a:t>23/03/2025</a:t>
+              <a:t>12/07/2025</a:t>
             </a:fld>
             <a:endParaRPr lang="pt-BR"/>
           </a:p>
@@ -981,7 +981,7 @@
           <a:p>
             <a:fld id="{2E700DB3-DBF0-4086-B675-117E7A9610B8}" type="datetimeFigureOut">
               <a:rPr lang="pt-BR" smtClean="0"/>
-              <a:t>23/03/2025</a:t>
+              <a:t>12/07/2025</a:t>
             </a:fld>
             <a:endParaRPr lang="pt-BR"/>
           </a:p>
@@ -1146,7 +1146,7 @@
           <a:p>
             <a:fld id="{2E700DB3-DBF0-4086-B675-117E7A9610B8}" type="datetimeFigureOut">
               <a:rPr lang="pt-BR" smtClean="0"/>
-              <a:t>23/03/2025</a:t>
+              <a:t>12/07/2025</a:t>
             </a:fld>
             <a:endParaRPr lang="pt-BR"/>
           </a:p>
@@ -1387,7 +1387,7 @@
           <a:p>
             <a:fld id="{2E700DB3-DBF0-4086-B675-117E7A9610B8}" type="datetimeFigureOut">
               <a:rPr lang="pt-BR" smtClean="0"/>
-              <a:t>23/03/2025</a:t>
+              <a:t>12/07/2025</a:t>
             </a:fld>
             <a:endParaRPr lang="pt-BR"/>
           </a:p>
@@ -1670,7 +1670,7 @@
           <a:p>
             <a:fld id="{2E700DB3-DBF0-4086-B675-117E7A9610B8}" type="datetimeFigureOut">
               <a:rPr lang="pt-BR" smtClean="0"/>
-              <a:t>23/03/2025</a:t>
+              <a:t>12/07/2025</a:t>
             </a:fld>
             <a:endParaRPr lang="pt-BR"/>
           </a:p>
@@ -2087,7 +2087,7 @@
           <a:p>
             <a:fld id="{2E700DB3-DBF0-4086-B675-117E7A9610B8}" type="datetimeFigureOut">
               <a:rPr lang="pt-BR" smtClean="0"/>
-              <a:t>23/03/2025</a:t>
+              <a:t>12/07/2025</a:t>
             </a:fld>
             <a:endParaRPr lang="pt-BR"/>
           </a:p>
@@ -2200,7 +2200,7 @@
           <a:p>
             <a:fld id="{2E700DB3-DBF0-4086-B675-117E7A9610B8}" type="datetimeFigureOut">
               <a:rPr lang="pt-BR" smtClean="0"/>
-              <a:t>23/03/2025</a:t>
+              <a:t>12/07/2025</a:t>
             </a:fld>
             <a:endParaRPr lang="pt-BR"/>
           </a:p>
@@ -2290,7 +2290,7 @@
           <a:p>
             <a:fld id="{2E700DB3-DBF0-4086-B675-117E7A9610B8}" type="datetimeFigureOut">
               <a:rPr lang="pt-BR" smtClean="0"/>
-              <a:t>23/03/2025</a:t>
+              <a:t>12/07/2025</a:t>
             </a:fld>
             <a:endParaRPr lang="pt-BR"/>
           </a:p>
@@ -2562,7 +2562,7 @@
           <a:p>
             <a:fld id="{2E700DB3-DBF0-4086-B675-117E7A9610B8}" type="datetimeFigureOut">
               <a:rPr lang="pt-BR" smtClean="0"/>
-              <a:t>23/03/2025</a:t>
+              <a:t>12/07/2025</a:t>
             </a:fld>
             <a:endParaRPr lang="pt-BR"/>
           </a:p>
@@ -2810,7 +2810,7 @@
           <a:p>
             <a:fld id="{2E700DB3-DBF0-4086-B675-117E7A9610B8}" type="datetimeFigureOut">
               <a:rPr lang="pt-BR" smtClean="0"/>
-              <a:t>23/03/2025</a:t>
+              <a:t>12/07/2025</a:t>
             </a:fld>
             <a:endParaRPr lang="pt-BR"/>
           </a:p>
@@ -3018,7 +3018,7 @@
           <a:p>
             <a:fld id="{2E700DB3-DBF0-4086-B675-117E7A9610B8}" type="datetimeFigureOut">
               <a:rPr lang="pt-BR" smtClean="0"/>
-              <a:t>23/03/2025</a:t>
+              <a:t>12/07/2025</a:t>
             </a:fld>
             <a:endParaRPr lang="pt-BR"/>
           </a:p>
@@ -4412,6 +4412,89 @@
           </p:style>
         </p:cxnSp>
       </p:grpSp>
+      <p:sp>
+        <p:nvSpPr>
+          <p:cNvPr id="37" name="Retângulo de cantos arredondados 36"/>
+          <p:cNvSpPr/>
+          <p:nvPr/>
+        </p:nvSpPr>
+        <p:spPr>
+          <a:xfrm>
+            <a:off x="4077945" y="5479825"/>
+            <a:ext cx="1656341" cy="552416"/>
+          </a:xfrm>
+          <a:prstGeom prst="roundRect">
+            <a:avLst/>
+          </a:prstGeom>
+        </p:spPr>
+        <p:style>
+          <a:lnRef idx="2">
+            <a:schemeClr val="dk1"/>
+          </a:lnRef>
+          <a:fillRef idx="1">
+            <a:schemeClr val="lt1"/>
+          </a:fillRef>
+          <a:effectRef idx="0">
+            <a:schemeClr val="dk1"/>
+          </a:effectRef>
+          <a:fontRef idx="minor">
+            <a:schemeClr val="dk1"/>
+          </a:fontRef>
+        </p:style>
+        <p:txBody>
+          <a:bodyPr rtlCol="0" anchor="ctr"/>
+          <a:lstStyle/>
+          <a:p>
+            <a:pPr algn="ctr"/>
+            <a:r>
+              <a:rPr lang="pt-BR" b="1" dirty="0" err="1" smtClean="0"/>
+              <a:t>SysNegocio</a:t>
+            </a:r>
+            <a:endParaRPr lang="pt-BR" b="1" dirty="0"/>
+          </a:p>
+        </p:txBody>
+      </p:sp>
+      <p:cxnSp>
+        <p:nvCxnSpPr>
+          <p:cNvPr id="11" name="Conector angulado 10"/>
+          <p:cNvCxnSpPr>
+            <a:stCxn id="37" idx="3"/>
+            <a:endCxn id="36" idx="1"/>
+          </p:cNvCxnSpPr>
+          <p:nvPr/>
+        </p:nvCxnSpPr>
+        <p:spPr>
+          <a:xfrm flipV="1">
+            <a:off x="5734286" y="4933534"/>
+            <a:ext cx="889064" cy="822499"/>
+          </a:xfrm>
+          <a:prstGeom prst="bentConnector3">
+            <a:avLst>
+              <a:gd name="adj1" fmla="val 50000"/>
+            </a:avLst>
+          </a:prstGeom>
+          <a:ln w="31750">
+            <a:solidFill>
+              <a:schemeClr val="tx1"/>
+            </a:solidFill>
+            <a:tailEnd type="arrow"/>
+          </a:ln>
+        </p:spPr>
+        <p:style>
+          <a:lnRef idx="1">
+            <a:schemeClr val="accent1"/>
+          </a:lnRef>
+          <a:fillRef idx="0">
+            <a:schemeClr val="accent1"/>
+          </a:fillRef>
+          <a:effectRef idx="0">
+            <a:schemeClr val="accent1"/>
+          </a:effectRef>
+          <a:fontRef idx="minor">
+            <a:schemeClr val="tx1"/>
+          </a:fontRef>
+        </p:style>
+      </p:cxnSp>
     </p:spTree>
     <p:extLst>
       <p:ext uri="{BB962C8B-B14F-4D97-AF65-F5344CB8AC3E}">

</xml_diff>